<commit_message>
-Energiefluss in Hardwarekapitel hinzugefügt -Abschnitt regler -> bahnspannung ergänzt -bildunterschriften in reglerkapitel ergänzt
</commit_message>
<xml_diff>
--- a/rec/bilder a4.pptx
+++ b/rec/bilder a4.pptx
@@ -9,6 +9,7 @@
     <p:sldId id="256" r:id="rId3"/>
     <p:sldId id="257" r:id="rId4"/>
     <p:sldId id="258" r:id="rId5"/>
+    <p:sldId id="259" r:id="rId6"/>
   </p:sldIdLst>
   <p:sldSz cx="6858000" cy="9906000" type="A4"/>
   <p:notesSz cx="7559675" cy="10691813"/>
@@ -10724,6 +10725,676 @@
     <p:extLst>
       <p:ext uri="{BB962C8B-B14F-4D97-AF65-F5344CB8AC3E}">
         <p14:creationId xmlns:p14="http://schemas.microsoft.com/office/powerpoint/2010/main" val="4135899180"/>
+      </p:ext>
+    </p:extLst>
+  </p:cSld>
+  <p:clrMapOvr>
+    <a:masterClrMapping/>
+  </p:clrMapOvr>
+</p:sld>
+</file>
+
+<file path=ppt/slides/slide4.xml><?xml version="1.0" encoding="utf-8"?>
+<p:sld xmlns:a="http://schemas.openxmlformats.org/drawingml/2006/main" xmlns:r="http://schemas.openxmlformats.org/officeDocument/2006/relationships" xmlns:p="http://schemas.openxmlformats.org/presentationml/2006/main">
+  <p:cSld>
+    <p:spTree>
+      <p:nvGrpSpPr>
+        <p:cNvPr id="1" name=""/>
+        <p:cNvGrpSpPr/>
+        <p:nvPr/>
+      </p:nvGrpSpPr>
+      <p:grpSpPr>
+        <a:xfrm>
+          <a:off x="0" y="0"/>
+          <a:ext cx="0" cy="0"/>
+          <a:chOff x="0" y="0"/>
+          <a:chExt cx="0" cy="0"/>
+        </a:xfrm>
+      </p:grpSpPr>
+      <p:sp>
+        <p:nvSpPr>
+          <p:cNvPr id="18" name="Textfeld 17">
+            <a:extLst>
+              <a:ext uri="{FF2B5EF4-FFF2-40B4-BE49-F238E27FC236}">
+                <a16:creationId xmlns:a16="http://schemas.microsoft.com/office/drawing/2014/main" id="{0D093BAF-FF84-4CE3-9408-52AF71FCA154}"/>
+              </a:ext>
+            </a:extLst>
+          </p:cNvPr>
+          <p:cNvSpPr txBox="1"/>
+          <p:nvPr/>
+        </p:nvSpPr>
+        <p:spPr>
+          <a:xfrm>
+            <a:off x="956759" y="204215"/>
+            <a:ext cx="949415" cy="1501345"/>
+          </a:xfrm>
+          <a:prstGeom prst="rect">
+            <a:avLst/>
+          </a:prstGeom>
+          <a:noFill/>
+          <a:ln w="25400">
+            <a:solidFill>
+              <a:schemeClr val="tx1"/>
+            </a:solidFill>
+            <a:prstDash val="sysDash"/>
+          </a:ln>
+        </p:spPr>
+        <p:txBody>
+          <a:bodyPr wrap="square" rtlCol="0">
+            <a:spAutoFit/>
+          </a:bodyPr>
+          <a:lstStyle/>
+          <a:p>
+            <a:endParaRPr lang="de-DE" dirty="0"/>
+          </a:p>
+        </p:txBody>
+      </p:sp>
+      <p:cxnSp>
+        <p:nvCxnSpPr>
+          <p:cNvPr id="15" name="Gerade Verbindung mit Pfeil 14">
+            <a:extLst>
+              <a:ext uri="{FF2B5EF4-FFF2-40B4-BE49-F238E27FC236}">
+                <a16:creationId xmlns:a16="http://schemas.microsoft.com/office/drawing/2014/main" id="{74F4F1BF-DC59-429A-82A1-1FC3A43C7116}"/>
+              </a:ext>
+            </a:extLst>
+          </p:cNvPr>
+          <p:cNvCxnSpPr>
+            <a:cxnSpLocks/>
+          </p:cNvCxnSpPr>
+          <p:nvPr/>
+        </p:nvCxnSpPr>
+        <p:spPr>
+          <a:xfrm>
+            <a:off x="1060123" y="314746"/>
+            <a:ext cx="588159" cy="616014"/>
+          </a:xfrm>
+          <a:prstGeom prst="straightConnector1">
+            <a:avLst/>
+          </a:prstGeom>
+          <a:ln w="25400">
+            <a:solidFill>
+              <a:schemeClr val="tx1"/>
+            </a:solidFill>
+            <a:prstDash val="solid"/>
+            <a:tailEnd type="none"/>
+          </a:ln>
+        </p:spPr>
+        <p:style>
+          <a:lnRef idx="1">
+            <a:schemeClr val="accent1"/>
+          </a:lnRef>
+          <a:fillRef idx="0">
+            <a:schemeClr val="accent1"/>
+          </a:fillRef>
+          <a:effectRef idx="0">
+            <a:schemeClr val="accent1"/>
+          </a:effectRef>
+          <a:fontRef idx="minor">
+            <a:schemeClr val="tx1"/>
+          </a:fontRef>
+        </p:style>
+      </p:cxnSp>
+      <p:cxnSp>
+        <p:nvCxnSpPr>
+          <p:cNvPr id="19" name="Gerade Verbindung mit Pfeil 18">
+            <a:extLst>
+              <a:ext uri="{FF2B5EF4-FFF2-40B4-BE49-F238E27FC236}">
+                <a16:creationId xmlns:a16="http://schemas.microsoft.com/office/drawing/2014/main" id="{3E3F9A35-B692-43CC-A9B9-500AD31B159C}"/>
+              </a:ext>
+            </a:extLst>
+          </p:cNvPr>
+          <p:cNvCxnSpPr>
+            <a:cxnSpLocks/>
+          </p:cNvCxnSpPr>
+          <p:nvPr/>
+        </p:nvCxnSpPr>
+        <p:spPr>
+          <a:xfrm flipH="1" flipV="1">
+            <a:off x="2726520" y="926841"/>
+            <a:ext cx="562453" cy="900"/>
+          </a:xfrm>
+          <a:prstGeom prst="straightConnector1">
+            <a:avLst/>
+          </a:prstGeom>
+          <a:ln w="25400">
+            <a:solidFill>
+              <a:schemeClr val="tx1"/>
+            </a:solidFill>
+            <a:headEnd type="triangle"/>
+            <a:tailEnd type="none"/>
+          </a:ln>
+        </p:spPr>
+        <p:style>
+          <a:lnRef idx="1">
+            <a:schemeClr val="accent1"/>
+          </a:lnRef>
+          <a:fillRef idx="0">
+            <a:schemeClr val="accent1"/>
+          </a:fillRef>
+          <a:effectRef idx="0">
+            <a:schemeClr val="accent1"/>
+          </a:effectRef>
+          <a:fontRef idx="minor">
+            <a:schemeClr val="tx1"/>
+          </a:fontRef>
+        </p:style>
+      </p:cxnSp>
+      <p:sp>
+        <p:nvSpPr>
+          <p:cNvPr id="28" name="Textfeld 27">
+            <a:extLst>
+              <a:ext uri="{FF2B5EF4-FFF2-40B4-BE49-F238E27FC236}">
+                <a16:creationId xmlns:a16="http://schemas.microsoft.com/office/drawing/2014/main" id="{A291452F-F6AB-4EB7-AA0B-80A0B211594E}"/>
+              </a:ext>
+            </a:extLst>
+          </p:cNvPr>
+          <p:cNvSpPr txBox="1"/>
+          <p:nvPr/>
+        </p:nvSpPr>
+        <p:spPr>
+          <a:xfrm>
+            <a:off x="200173" y="155962"/>
+            <a:ext cx="612008" cy="323976"/>
+          </a:xfrm>
+          <a:prstGeom prst="rect">
+            <a:avLst/>
+          </a:prstGeom>
+          <a:noFill/>
+          <a:ln w="25400">
+            <a:solidFill>
+              <a:schemeClr val="tx1"/>
+            </a:solidFill>
+            <a:prstDash val="solid"/>
+          </a:ln>
+        </p:spPr>
+        <p:txBody>
+          <a:bodyPr wrap="square" rtlCol="0">
+            <a:spAutoFit/>
+          </a:bodyPr>
+          <a:lstStyle/>
+          <a:p>
+            <a:endParaRPr lang="de-DE" dirty="0"/>
+          </a:p>
+        </p:txBody>
+      </p:sp>
+      <p:sp>
+        <p:nvSpPr>
+          <p:cNvPr id="29" name="Textfeld 28">
+            <a:extLst>
+              <a:ext uri="{FF2B5EF4-FFF2-40B4-BE49-F238E27FC236}">
+                <a16:creationId xmlns:a16="http://schemas.microsoft.com/office/drawing/2014/main" id="{971F1123-0533-4C21-A9A1-B90BC93F5F37}"/>
+              </a:ext>
+            </a:extLst>
+          </p:cNvPr>
+          <p:cNvSpPr txBox="1"/>
+          <p:nvPr/>
+        </p:nvSpPr>
+        <p:spPr>
+          <a:xfrm>
+            <a:off x="0" y="191820"/>
+            <a:ext cx="1008112" cy="246221"/>
+          </a:xfrm>
+          <a:prstGeom prst="rect">
+            <a:avLst/>
+          </a:prstGeom>
+          <a:noFill/>
+        </p:spPr>
+        <p:txBody>
+          <a:bodyPr wrap="square" rtlCol="0" anchor="ctr">
+            <a:spAutoFit/>
+          </a:bodyPr>
+          <a:lstStyle/>
+          <a:p>
+            <a:pPr algn="ctr"/>
+            <a:r>
+              <a:rPr lang="de-DE" sz="1000" dirty="0"/>
+              <a:t>PV</a:t>
+            </a:r>
+          </a:p>
+        </p:txBody>
+      </p:sp>
+      <p:sp>
+        <p:nvSpPr>
+          <p:cNvPr id="32" name="Textfeld 31">
+            <a:extLst>
+              <a:ext uri="{FF2B5EF4-FFF2-40B4-BE49-F238E27FC236}">
+                <a16:creationId xmlns:a16="http://schemas.microsoft.com/office/drawing/2014/main" id="{1A7E74C2-0932-4793-B68F-24E92BFB0E3D}"/>
+              </a:ext>
+            </a:extLst>
+          </p:cNvPr>
+          <p:cNvSpPr txBox="1"/>
+          <p:nvPr/>
+        </p:nvSpPr>
+        <p:spPr>
+          <a:xfrm>
+            <a:off x="2114512" y="768773"/>
+            <a:ext cx="612008" cy="323976"/>
+          </a:xfrm>
+          <a:prstGeom prst="rect">
+            <a:avLst/>
+          </a:prstGeom>
+          <a:noFill/>
+          <a:ln w="25400">
+            <a:solidFill>
+              <a:schemeClr val="tx1"/>
+            </a:solidFill>
+            <a:prstDash val="solid"/>
+          </a:ln>
+        </p:spPr>
+        <p:txBody>
+          <a:bodyPr wrap="square" rtlCol="0">
+            <a:spAutoFit/>
+          </a:bodyPr>
+          <a:lstStyle/>
+          <a:p>
+            <a:endParaRPr lang="de-DE" dirty="0"/>
+          </a:p>
+        </p:txBody>
+      </p:sp>
+      <p:sp>
+        <p:nvSpPr>
+          <p:cNvPr id="33" name="Textfeld 32">
+            <a:extLst>
+              <a:ext uri="{FF2B5EF4-FFF2-40B4-BE49-F238E27FC236}">
+                <a16:creationId xmlns:a16="http://schemas.microsoft.com/office/drawing/2014/main" id="{3E10058F-8173-4874-8890-EBE96A671408}"/>
+              </a:ext>
+            </a:extLst>
+          </p:cNvPr>
+          <p:cNvSpPr txBox="1"/>
+          <p:nvPr/>
+        </p:nvSpPr>
+        <p:spPr>
+          <a:xfrm>
+            <a:off x="1899464" y="807650"/>
+            <a:ext cx="1008112" cy="246221"/>
+          </a:xfrm>
+          <a:prstGeom prst="rect">
+            <a:avLst/>
+          </a:prstGeom>
+          <a:noFill/>
+        </p:spPr>
+        <p:txBody>
+          <a:bodyPr wrap="square" rtlCol="0" anchor="ctr">
+            <a:spAutoFit/>
+          </a:bodyPr>
+          <a:lstStyle/>
+          <a:p>
+            <a:pPr algn="ctr"/>
+            <a:r>
+              <a:rPr lang="de-DE" sz="1000" dirty="0"/>
+              <a:t>TSS</a:t>
+            </a:r>
+          </a:p>
+        </p:txBody>
+      </p:sp>
+      <p:cxnSp>
+        <p:nvCxnSpPr>
+          <p:cNvPr id="34" name="Gerade Verbindung mit Pfeil 33">
+            <a:extLst>
+              <a:ext uri="{FF2B5EF4-FFF2-40B4-BE49-F238E27FC236}">
+                <a16:creationId xmlns:a16="http://schemas.microsoft.com/office/drawing/2014/main" id="{418A7DE2-896B-4A68-BCCE-5CD425DB5F81}"/>
+              </a:ext>
+            </a:extLst>
+          </p:cNvPr>
+          <p:cNvCxnSpPr>
+            <a:cxnSpLocks/>
+          </p:cNvCxnSpPr>
+          <p:nvPr/>
+        </p:nvCxnSpPr>
+        <p:spPr>
+          <a:xfrm flipH="1">
+            <a:off x="812181" y="311540"/>
+            <a:ext cx="247942" cy="0"/>
+          </a:xfrm>
+          <a:prstGeom prst="straightConnector1">
+            <a:avLst/>
+          </a:prstGeom>
+          <a:ln w="25400">
+            <a:solidFill>
+              <a:schemeClr val="tx1"/>
+            </a:solidFill>
+            <a:headEnd type="none"/>
+            <a:tailEnd type="none"/>
+          </a:ln>
+        </p:spPr>
+        <p:style>
+          <a:lnRef idx="1">
+            <a:schemeClr val="accent1"/>
+          </a:lnRef>
+          <a:fillRef idx="0">
+            <a:schemeClr val="accent1"/>
+          </a:fillRef>
+          <a:effectRef idx="0">
+            <a:schemeClr val="accent1"/>
+          </a:effectRef>
+          <a:fontRef idx="minor">
+            <a:schemeClr val="tx1"/>
+          </a:fontRef>
+        </p:style>
+      </p:cxnSp>
+      <p:cxnSp>
+        <p:nvCxnSpPr>
+          <p:cNvPr id="36" name="Gerade Verbindung mit Pfeil 35">
+            <a:extLst>
+              <a:ext uri="{FF2B5EF4-FFF2-40B4-BE49-F238E27FC236}">
+                <a16:creationId xmlns:a16="http://schemas.microsoft.com/office/drawing/2014/main" id="{1661E1FE-07CA-411D-8469-B1EB6870A74F}"/>
+              </a:ext>
+            </a:extLst>
+          </p:cNvPr>
+          <p:cNvCxnSpPr>
+            <a:cxnSpLocks/>
+          </p:cNvCxnSpPr>
+          <p:nvPr/>
+        </p:nvCxnSpPr>
+        <p:spPr>
+          <a:xfrm flipH="1">
+            <a:off x="961294" y="935268"/>
+            <a:ext cx="136079" cy="0"/>
+          </a:xfrm>
+          <a:prstGeom prst="straightConnector1">
+            <a:avLst/>
+          </a:prstGeom>
+          <a:ln w="25400">
+            <a:solidFill>
+              <a:schemeClr val="tx1"/>
+            </a:solidFill>
+            <a:headEnd type="none"/>
+            <a:tailEnd type="none"/>
+          </a:ln>
+        </p:spPr>
+        <p:style>
+          <a:lnRef idx="1">
+            <a:schemeClr val="accent1"/>
+          </a:lnRef>
+          <a:fillRef idx="0">
+            <a:schemeClr val="accent1"/>
+          </a:fillRef>
+          <a:effectRef idx="0">
+            <a:schemeClr val="accent1"/>
+          </a:effectRef>
+          <a:fontRef idx="minor">
+            <a:schemeClr val="tx1"/>
+          </a:fontRef>
+        </p:style>
+      </p:cxnSp>
+      <p:cxnSp>
+        <p:nvCxnSpPr>
+          <p:cNvPr id="37" name="Gerade Verbindung mit Pfeil 36">
+            <a:extLst>
+              <a:ext uri="{FF2B5EF4-FFF2-40B4-BE49-F238E27FC236}">
+                <a16:creationId xmlns:a16="http://schemas.microsoft.com/office/drawing/2014/main" id="{A5087349-E044-41B8-BC83-E1806EB7621D}"/>
+              </a:ext>
+            </a:extLst>
+          </p:cNvPr>
+          <p:cNvCxnSpPr>
+            <a:cxnSpLocks/>
+          </p:cNvCxnSpPr>
+          <p:nvPr/>
+        </p:nvCxnSpPr>
+        <p:spPr>
+          <a:xfrm>
+            <a:off x="1648282" y="935268"/>
+            <a:ext cx="466230" cy="0"/>
+          </a:xfrm>
+          <a:prstGeom prst="straightConnector1">
+            <a:avLst/>
+          </a:prstGeom>
+          <a:ln w="25400">
+            <a:solidFill>
+              <a:schemeClr val="tx1"/>
+            </a:solidFill>
+            <a:headEnd type="none"/>
+            <a:tailEnd type="triangle"/>
+          </a:ln>
+        </p:spPr>
+        <p:style>
+          <a:lnRef idx="1">
+            <a:schemeClr val="accent1"/>
+          </a:lnRef>
+          <a:fillRef idx="0">
+            <a:schemeClr val="accent1"/>
+          </a:fillRef>
+          <a:effectRef idx="0">
+            <a:schemeClr val="accent1"/>
+          </a:effectRef>
+          <a:fontRef idx="minor">
+            <a:schemeClr val="tx1"/>
+          </a:fontRef>
+        </p:style>
+      </p:cxnSp>
+      <p:sp>
+        <p:nvSpPr>
+          <p:cNvPr id="41" name="Textfeld 40">
+            <a:extLst>
+              <a:ext uri="{FF2B5EF4-FFF2-40B4-BE49-F238E27FC236}">
+                <a16:creationId xmlns:a16="http://schemas.microsoft.com/office/drawing/2014/main" id="{70BDBC08-6DA2-42B0-91A8-1F1CBBA3AEE6}"/>
+              </a:ext>
+            </a:extLst>
+          </p:cNvPr>
+          <p:cNvSpPr txBox="1"/>
+          <p:nvPr/>
+        </p:nvSpPr>
+        <p:spPr>
+          <a:xfrm>
+            <a:off x="200173" y="1381584"/>
+            <a:ext cx="612008" cy="323976"/>
+          </a:xfrm>
+          <a:prstGeom prst="rect">
+            <a:avLst/>
+          </a:prstGeom>
+          <a:noFill/>
+          <a:ln w="25400">
+            <a:solidFill>
+              <a:schemeClr val="tx1"/>
+            </a:solidFill>
+            <a:prstDash val="solid"/>
+          </a:ln>
+        </p:spPr>
+        <p:txBody>
+          <a:bodyPr wrap="square" rtlCol="0">
+            <a:spAutoFit/>
+          </a:bodyPr>
+          <a:lstStyle/>
+          <a:p>
+            <a:endParaRPr lang="de-DE" dirty="0"/>
+          </a:p>
+        </p:txBody>
+      </p:sp>
+      <p:sp>
+        <p:nvSpPr>
+          <p:cNvPr id="42" name="Textfeld 41">
+            <a:extLst>
+              <a:ext uri="{FF2B5EF4-FFF2-40B4-BE49-F238E27FC236}">
+                <a16:creationId xmlns:a16="http://schemas.microsoft.com/office/drawing/2014/main" id="{185A02B6-DAB5-4BF1-A8F2-4D2ACB01CA93}"/>
+              </a:ext>
+            </a:extLst>
+          </p:cNvPr>
+          <p:cNvSpPr txBox="1"/>
+          <p:nvPr/>
+        </p:nvSpPr>
+        <p:spPr>
+          <a:xfrm>
+            <a:off x="0" y="1417442"/>
+            <a:ext cx="1008112" cy="246221"/>
+          </a:xfrm>
+          <a:prstGeom prst="rect">
+            <a:avLst/>
+          </a:prstGeom>
+          <a:noFill/>
+        </p:spPr>
+        <p:txBody>
+          <a:bodyPr wrap="square" rtlCol="0" anchor="ctr">
+            <a:spAutoFit/>
+          </a:bodyPr>
+          <a:lstStyle/>
+          <a:p>
+            <a:pPr algn="ctr"/>
+            <a:r>
+              <a:rPr lang="de-DE" sz="1000" dirty="0"/>
+              <a:t>Netz</a:t>
+            </a:r>
+          </a:p>
+        </p:txBody>
+      </p:sp>
+      <p:cxnSp>
+        <p:nvCxnSpPr>
+          <p:cNvPr id="43" name="Gerade Verbindung mit Pfeil 42">
+            <a:extLst>
+              <a:ext uri="{FF2B5EF4-FFF2-40B4-BE49-F238E27FC236}">
+                <a16:creationId xmlns:a16="http://schemas.microsoft.com/office/drawing/2014/main" id="{BF1322CA-8D7B-4D9A-B686-D5A3F9CD87FD}"/>
+              </a:ext>
+            </a:extLst>
+          </p:cNvPr>
+          <p:cNvCxnSpPr>
+            <a:cxnSpLocks/>
+          </p:cNvCxnSpPr>
+          <p:nvPr/>
+        </p:nvCxnSpPr>
+        <p:spPr>
+          <a:xfrm flipH="1">
+            <a:off x="812181" y="1548079"/>
+            <a:ext cx="247942" cy="0"/>
+          </a:xfrm>
+          <a:prstGeom prst="straightConnector1">
+            <a:avLst/>
+          </a:prstGeom>
+          <a:ln w="25400">
+            <a:solidFill>
+              <a:schemeClr val="tx1"/>
+            </a:solidFill>
+            <a:headEnd type="none"/>
+            <a:tailEnd type="none"/>
+          </a:ln>
+        </p:spPr>
+        <p:style>
+          <a:lnRef idx="1">
+            <a:schemeClr val="accent1"/>
+          </a:lnRef>
+          <a:fillRef idx="0">
+            <a:schemeClr val="accent1"/>
+          </a:fillRef>
+          <a:effectRef idx="0">
+            <a:schemeClr val="accent1"/>
+          </a:effectRef>
+          <a:fontRef idx="minor">
+            <a:schemeClr val="tx1"/>
+          </a:fontRef>
+        </p:style>
+      </p:cxnSp>
+      <p:sp>
+        <p:nvSpPr>
+          <p:cNvPr id="49" name="Textfeld 48">
+            <a:extLst>
+              <a:ext uri="{FF2B5EF4-FFF2-40B4-BE49-F238E27FC236}">
+                <a16:creationId xmlns:a16="http://schemas.microsoft.com/office/drawing/2014/main" id="{089527AA-9915-4709-BBD1-32F94D2D31B8}"/>
+              </a:ext>
+            </a:extLst>
+          </p:cNvPr>
+          <p:cNvSpPr txBox="1"/>
+          <p:nvPr/>
+        </p:nvSpPr>
+        <p:spPr>
+          <a:xfrm>
+            <a:off x="3288973" y="764756"/>
+            <a:ext cx="612008" cy="323976"/>
+          </a:xfrm>
+          <a:prstGeom prst="rect">
+            <a:avLst/>
+          </a:prstGeom>
+          <a:noFill/>
+          <a:ln w="25400">
+            <a:solidFill>
+              <a:schemeClr val="tx1"/>
+            </a:solidFill>
+            <a:prstDash val="solid"/>
+          </a:ln>
+        </p:spPr>
+        <p:txBody>
+          <a:bodyPr wrap="square" rtlCol="0">
+            <a:spAutoFit/>
+          </a:bodyPr>
+          <a:lstStyle/>
+          <a:p>
+            <a:endParaRPr lang="de-DE" dirty="0"/>
+          </a:p>
+        </p:txBody>
+      </p:sp>
+      <p:sp>
+        <p:nvSpPr>
+          <p:cNvPr id="50" name="Textfeld 49">
+            <a:extLst>
+              <a:ext uri="{FF2B5EF4-FFF2-40B4-BE49-F238E27FC236}">
+                <a16:creationId xmlns:a16="http://schemas.microsoft.com/office/drawing/2014/main" id="{3AA8CE60-BE8D-40D2-8D61-BCFC9A213056}"/>
+              </a:ext>
+            </a:extLst>
+          </p:cNvPr>
+          <p:cNvSpPr txBox="1"/>
+          <p:nvPr/>
+        </p:nvSpPr>
+        <p:spPr>
+          <a:xfrm>
+            <a:off x="3073925" y="803633"/>
+            <a:ext cx="1008112" cy="246221"/>
+          </a:xfrm>
+          <a:prstGeom prst="rect">
+            <a:avLst/>
+          </a:prstGeom>
+          <a:noFill/>
+        </p:spPr>
+        <p:txBody>
+          <a:bodyPr wrap="square" rtlCol="0" anchor="ctr">
+            <a:spAutoFit/>
+          </a:bodyPr>
+          <a:lstStyle/>
+          <a:p>
+            <a:pPr algn="ctr"/>
+            <a:r>
+              <a:rPr lang="de-DE" sz="1000" dirty="0"/>
+              <a:t>Auto</a:t>
+            </a:r>
+          </a:p>
+        </p:txBody>
+      </p:sp>
+      <p:sp>
+        <p:nvSpPr>
+          <p:cNvPr id="20" name="Textfeld 19">
+            <a:extLst>
+              <a:ext uri="{FF2B5EF4-FFF2-40B4-BE49-F238E27FC236}">
+                <a16:creationId xmlns:a16="http://schemas.microsoft.com/office/drawing/2014/main" id="{85D83572-E30D-4F1B-87AB-E42A3C232A75}"/>
+              </a:ext>
+            </a:extLst>
+          </p:cNvPr>
+          <p:cNvSpPr txBox="1"/>
+          <p:nvPr/>
+        </p:nvSpPr>
+        <p:spPr>
+          <a:xfrm>
+            <a:off x="859160" y="0"/>
+            <a:ext cx="1135142" cy="246221"/>
+          </a:xfrm>
+          <a:prstGeom prst="rect">
+            <a:avLst/>
+          </a:prstGeom>
+          <a:noFill/>
+        </p:spPr>
+        <p:txBody>
+          <a:bodyPr wrap="square" rtlCol="0" anchor="ctr">
+            <a:spAutoFit/>
+          </a:bodyPr>
+          <a:lstStyle/>
+          <a:p>
+            <a:pPr algn="ctr"/>
+            <a:r>
+              <a:rPr lang="de-DE" sz="1000" dirty="0"/>
+              <a:t>Wechselschalter</a:t>
+            </a:r>
+          </a:p>
+        </p:txBody>
+      </p:sp>
+    </p:spTree>
+    <p:extLst>
+      <p:ext uri="{BB962C8B-B14F-4D97-AF65-F5344CB8AC3E}">
+        <p14:creationId xmlns:p14="http://schemas.microsoft.com/office/powerpoint/2010/main" val="1812007573"/>
       </p:ext>
     </p:extLst>
   </p:cSld>

</xml_diff>

<commit_message>
-added finished section "Regler"
</commit_message>
<xml_diff>
--- a/rec/bilder a4.pptx
+++ b/rec/bilder a4.pptx
@@ -8569,6 +8569,90 @@
       </p:grpSpPr>
       <p:sp>
         <p:nvSpPr>
+          <p:cNvPr id="27" name="Textfeld 26">
+            <a:extLst>
+              <a:ext uri="{FF2B5EF4-FFF2-40B4-BE49-F238E27FC236}">
+                <a16:creationId xmlns:a16="http://schemas.microsoft.com/office/drawing/2014/main" id="{5DD75A66-7AB5-48DC-92BC-0900D3F4E20E}"/>
+              </a:ext>
+            </a:extLst>
+          </p:cNvPr>
+          <p:cNvSpPr txBox="1"/>
+          <p:nvPr/>
+        </p:nvSpPr>
+        <p:spPr>
+          <a:xfrm>
+            <a:off x="4176660" y="8018292"/>
+            <a:ext cx="612008" cy="246221"/>
+          </a:xfrm>
+          <a:prstGeom prst="rect">
+            <a:avLst/>
+          </a:prstGeom>
+          <a:noFill/>
+        </p:spPr>
+        <p:txBody>
+          <a:bodyPr wrap="square" rtlCol="0" anchor="ctr">
+            <a:spAutoFit/>
+          </a:bodyPr>
+          <a:lstStyle/>
+          <a:p>
+            <a:pPr algn="ctr"/>
+            <a:r>
+              <a:rPr lang="de-DE" sz="1000" dirty="0" err="1"/>
+              <a:t>U</a:t>
+            </a:r>
+            <a:r>
+              <a:rPr lang="de-DE" sz="1000" baseline="-25000" dirty="0" err="1"/>
+              <a:t>Bahn</a:t>
+            </a:r>
+            <a:endParaRPr lang="de-DE" sz="1000" dirty="0"/>
+          </a:p>
+        </p:txBody>
+      </p:sp>
+      <p:sp>
+        <p:nvSpPr>
+          <p:cNvPr id="31" name="Textfeld 30">
+            <a:extLst>
+              <a:ext uri="{FF2B5EF4-FFF2-40B4-BE49-F238E27FC236}">
+                <a16:creationId xmlns:a16="http://schemas.microsoft.com/office/drawing/2014/main" id="{A96EC961-96D9-44CB-A1EF-0A9AE8E32FF2}"/>
+              </a:ext>
+            </a:extLst>
+          </p:cNvPr>
+          <p:cNvSpPr txBox="1"/>
+          <p:nvPr/>
+        </p:nvSpPr>
+        <p:spPr>
+          <a:xfrm>
+            <a:off x="3406115" y="8062088"/>
+            <a:ext cx="1067371" cy="400110"/>
+          </a:xfrm>
+          <a:prstGeom prst="rect">
+            <a:avLst/>
+          </a:prstGeom>
+          <a:noFill/>
+        </p:spPr>
+        <p:txBody>
+          <a:bodyPr wrap="square" rtlCol="0" anchor="ctr">
+            <a:spAutoFit/>
+          </a:bodyPr>
+          <a:lstStyle/>
+          <a:p>
+            <a:pPr algn="ctr"/>
+            <a:r>
+              <a:rPr lang="de-DE" sz="1000" dirty="0"/>
+              <a:t>Regelkreis</a:t>
+            </a:r>
+          </a:p>
+          <a:p>
+            <a:pPr algn="ctr"/>
+            <a:r>
+              <a:rPr lang="de-DE" sz="1000" dirty="0"/>
+              <a:t>Spannung</a:t>
+            </a:r>
+          </a:p>
+        </p:txBody>
+      </p:sp>
+      <p:sp>
+        <p:nvSpPr>
           <p:cNvPr id="30" name="Textfeld 29">
             <a:extLst>
               <a:ext uri="{FF2B5EF4-FFF2-40B4-BE49-F238E27FC236}">
@@ -8581,7 +8665,7 @@
         </p:nvSpPr>
         <p:spPr>
           <a:xfrm>
-            <a:off x="3539828" y="8109754"/>
+            <a:off x="3559254" y="8109754"/>
             <a:ext cx="725953" cy="323976"/>
           </a:xfrm>
           <a:prstGeom prst="rect">
@@ -8602,49 +8686,6 @@
           <a:lstStyle/>
           <a:p>
             <a:endParaRPr lang="de-DE" dirty="0"/>
-          </a:p>
-        </p:txBody>
-      </p:sp>
-      <p:sp>
-        <p:nvSpPr>
-          <p:cNvPr id="31" name="Textfeld 30">
-            <a:extLst>
-              <a:ext uri="{FF2B5EF4-FFF2-40B4-BE49-F238E27FC236}">
-                <a16:creationId xmlns:a16="http://schemas.microsoft.com/office/drawing/2014/main" id="{A96EC961-96D9-44CB-A1EF-0A9AE8E32FF2}"/>
-              </a:ext>
-            </a:extLst>
-          </p:cNvPr>
-          <p:cNvSpPr txBox="1"/>
-          <p:nvPr/>
-        </p:nvSpPr>
-        <p:spPr>
-          <a:xfrm>
-            <a:off x="3369503" y="8071687"/>
-            <a:ext cx="1067371" cy="400110"/>
-          </a:xfrm>
-          <a:prstGeom prst="rect">
-            <a:avLst/>
-          </a:prstGeom>
-          <a:noFill/>
-        </p:spPr>
-        <p:txBody>
-          <a:bodyPr wrap="square" rtlCol="0" anchor="ctr">
-            <a:spAutoFit/>
-          </a:bodyPr>
-          <a:lstStyle/>
-          <a:p>
-            <a:pPr algn="ctr"/>
-            <a:r>
-              <a:rPr lang="de-DE" sz="1000" dirty="0"/>
-              <a:t>Regelkreis</a:t>
-            </a:r>
-          </a:p>
-          <a:p>
-            <a:pPr algn="ctr"/>
-            <a:r>
-              <a:rPr lang="de-DE" sz="1000" dirty="0"/>
-              <a:t>Spannung</a:t>
-            </a:r>
           </a:p>
         </p:txBody>
       </p:sp>
@@ -8662,7 +8703,7 @@
         </p:nvSpPr>
         <p:spPr>
           <a:xfrm>
-            <a:off x="2380697" y="8111460"/>
+            <a:off x="2599455" y="8109755"/>
             <a:ext cx="612008" cy="323976"/>
           </a:xfrm>
           <a:prstGeom prst="rect">
@@ -8700,7 +8741,7 @@
         </p:nvSpPr>
         <p:spPr>
           <a:xfrm>
-            <a:off x="2186880" y="8141628"/>
+            <a:off x="2405638" y="8139923"/>
             <a:ext cx="1008112" cy="246221"/>
           </a:xfrm>
           <a:prstGeom prst="rect">
@@ -8736,7 +8777,7 @@
         </p:nvSpPr>
         <p:spPr>
           <a:xfrm>
-            <a:off x="2738261" y="8033634"/>
+            <a:off x="2853469" y="8033634"/>
             <a:ext cx="1008112" cy="246221"/>
           </a:xfrm>
           <a:prstGeom prst="rect">
@@ -8777,8 +8818,8 @@
         </p:nvSpPr>
         <p:spPr>
           <a:xfrm>
-            <a:off x="1579300" y="8109754"/>
-            <a:ext cx="612008" cy="323976"/>
+            <a:off x="1579299" y="8109754"/>
+            <a:ext cx="808979" cy="323976"/>
           </a:xfrm>
           <a:prstGeom prst="rect">
             <a:avLst/>
@@ -8815,7 +8856,7 @@
         </p:nvSpPr>
         <p:spPr>
           <a:xfrm>
-            <a:off x="1372585" y="8156745"/>
+            <a:off x="1497195" y="8148401"/>
             <a:ext cx="1008112" cy="246221"/>
           </a:xfrm>
           <a:prstGeom prst="rect">
@@ -8836,7 +8877,7 @@
             </a:r>
             <a:r>
               <a:rPr lang="de-DE" sz="1000" baseline="-25000" dirty="0" err="1"/>
-              <a:t>Automatik</a:t>
+              <a:t>Geschwindigkeit</a:t>
             </a:r>
             <a:endParaRPr lang="de-DE" sz="1000" dirty="0"/>
           </a:p>
@@ -8856,7 +8897,7 @@
         </p:nvSpPr>
         <p:spPr>
           <a:xfrm>
-            <a:off x="4716216" y="8102750"/>
+            <a:off x="4711804" y="8112912"/>
             <a:ext cx="612008" cy="323976"/>
           </a:xfrm>
           <a:prstGeom prst="rect">
@@ -8929,13 +8970,15 @@
           </p:cNvPr>
           <p:cNvCxnSpPr>
             <a:cxnSpLocks/>
+            <a:stCxn id="30" idx="3"/>
+            <a:endCxn id="23" idx="1"/>
           </p:cNvCxnSpPr>
           <p:nvPr/>
         </p:nvCxnSpPr>
         <p:spPr>
-          <a:xfrm>
-            <a:off x="4265781" y="8269464"/>
-            <a:ext cx="449418" cy="0"/>
+          <a:xfrm flipV="1">
+            <a:off x="4285207" y="8268418"/>
+            <a:ext cx="426597" cy="3324"/>
           </a:xfrm>
           <a:prstGeom prst="straightConnector1">
             <a:avLst/>
@@ -8979,8 +9022,8 @@
         </p:nvCxnSpPr>
         <p:spPr>
           <a:xfrm>
-            <a:off x="2992705" y="8273448"/>
-            <a:ext cx="547194" cy="0"/>
+            <a:off x="3211463" y="8271743"/>
+            <a:ext cx="353189" cy="0"/>
           </a:xfrm>
           <a:prstGeom prst="straightConnector1">
             <a:avLst/>
@@ -9018,14 +9061,15 @@
             </a:extLst>
           </p:cNvPr>
           <p:cNvCxnSpPr>
+            <a:cxnSpLocks/>
             <a:endCxn id="4" idx="1"/>
           </p:cNvCxnSpPr>
           <p:nvPr/>
         </p:nvCxnSpPr>
         <p:spPr>
           <a:xfrm>
-            <a:off x="2194548" y="8271744"/>
-            <a:ext cx="186149" cy="1704"/>
+            <a:off x="2381962" y="8269464"/>
+            <a:ext cx="217493" cy="2279"/>
           </a:xfrm>
           <a:prstGeom prst="straightConnector1">
             <a:avLst/>
@@ -9460,7 +9504,7 @@
         </p:nvSpPr>
         <p:spPr>
           <a:xfrm>
-            <a:off x="4708622" y="8139033"/>
+            <a:off x="4711804" y="8145307"/>
             <a:ext cx="627195" cy="246221"/>
           </a:xfrm>
           <a:prstGeom prst="rect">
@@ -9611,47 +9655,6 @@
       </p:sp>
       <p:sp>
         <p:nvSpPr>
-          <p:cNvPr id="27" name="Textfeld 26">
-            <a:extLst>
-              <a:ext uri="{FF2B5EF4-FFF2-40B4-BE49-F238E27FC236}">
-                <a16:creationId xmlns:a16="http://schemas.microsoft.com/office/drawing/2014/main" id="{5DD75A66-7AB5-48DC-92BC-0900D3F4E20E}"/>
-              </a:ext>
-            </a:extLst>
-          </p:cNvPr>
-          <p:cNvSpPr txBox="1"/>
-          <p:nvPr/>
-        </p:nvSpPr>
-        <p:spPr>
-          <a:xfrm>
-            <a:off x="4157981" y="8018517"/>
-            <a:ext cx="612008" cy="246221"/>
-          </a:xfrm>
-          <a:prstGeom prst="rect">
-            <a:avLst/>
-          </a:prstGeom>
-          <a:noFill/>
-        </p:spPr>
-        <p:txBody>
-          <a:bodyPr wrap="square" rtlCol="0" anchor="ctr">
-            <a:spAutoFit/>
-          </a:bodyPr>
-          <a:lstStyle/>
-          <a:p>
-            <a:pPr algn="ctr"/>
-            <a:r>
-              <a:rPr lang="de-DE" sz="1000" dirty="0" err="1"/>
-              <a:t>U</a:t>
-            </a:r>
-            <a:r>
-              <a:rPr lang="de-DE" sz="1000" baseline="-25000" dirty="0" err="1"/>
-              <a:t>Bahn</a:t>
-            </a:r>
-            <a:endParaRPr lang="de-DE" sz="1000" dirty="0"/>
-          </a:p>
-        </p:txBody>
-      </p:sp>
-      <p:sp>
-        <p:nvSpPr>
           <p:cNvPr id="28" name="Textfeld 27">
             <a:extLst>
               <a:ext uri="{FF2B5EF4-FFF2-40B4-BE49-F238E27FC236}">
@@ -9785,7 +9788,7 @@
         </p:nvSpPr>
         <p:spPr>
           <a:xfrm>
-            <a:off x="1675518" y="5037765"/>
+            <a:off x="1675518" y="5036067"/>
             <a:ext cx="612008" cy="323976"/>
           </a:xfrm>
           <a:prstGeom prst="rect">
@@ -10072,9 +10075,9 @@
           <p:nvPr/>
         </p:nvCxnSpPr>
         <p:spPr>
-          <a:xfrm flipV="1">
+          <a:xfrm>
             <a:off x="2287526" y="5198055"/>
-            <a:ext cx="299119" cy="1698"/>
+            <a:ext cx="299119" cy="0"/>
           </a:xfrm>
           <a:prstGeom prst="straightConnector1">
             <a:avLst/>
@@ -10718,6 +10721,78 @@
               <a:t>Dutycycle</a:t>
             </a:r>
             <a:endParaRPr lang="de-DE" sz="1000" dirty="0"/>
+          </a:p>
+        </p:txBody>
+      </p:sp>
+      <p:sp>
+        <p:nvSpPr>
+          <p:cNvPr id="67" name="Textfeld 66">
+            <a:extLst>
+              <a:ext uri="{FF2B5EF4-FFF2-40B4-BE49-F238E27FC236}">
+                <a16:creationId xmlns:a16="http://schemas.microsoft.com/office/drawing/2014/main" id="{8F6642B7-7B71-444A-A97C-5A585FECEAD8}"/>
+              </a:ext>
+            </a:extLst>
+          </p:cNvPr>
+          <p:cNvSpPr txBox="1"/>
+          <p:nvPr/>
+        </p:nvSpPr>
+        <p:spPr>
+          <a:xfrm>
+            <a:off x="1424075" y="8080423"/>
+            <a:ext cx="92584" cy="246221"/>
+          </a:xfrm>
+          <a:prstGeom prst="rect">
+            <a:avLst/>
+          </a:prstGeom>
+          <a:noFill/>
+        </p:spPr>
+        <p:txBody>
+          <a:bodyPr wrap="square" rtlCol="0" anchor="ctr">
+            <a:spAutoFit/>
+          </a:bodyPr>
+          <a:lstStyle/>
+          <a:p>
+            <a:pPr algn="ctr"/>
+            <a:r>
+              <a:rPr lang="de-DE" sz="1000" dirty="0"/>
+              <a:t>e</a:t>
+            </a:r>
+          </a:p>
+        </p:txBody>
+      </p:sp>
+      <p:sp>
+        <p:nvSpPr>
+          <p:cNvPr id="68" name="Textfeld 67">
+            <a:extLst>
+              <a:ext uri="{FF2B5EF4-FFF2-40B4-BE49-F238E27FC236}">
+                <a16:creationId xmlns:a16="http://schemas.microsoft.com/office/drawing/2014/main" id="{4F38FA91-8415-449E-BF90-97A59CDE22F3}"/>
+              </a:ext>
+            </a:extLst>
+          </p:cNvPr>
+          <p:cNvSpPr txBox="1"/>
+          <p:nvPr/>
+        </p:nvSpPr>
+        <p:spPr>
+          <a:xfrm>
+            <a:off x="1469869" y="4981287"/>
+            <a:ext cx="92584" cy="246221"/>
+          </a:xfrm>
+          <a:prstGeom prst="rect">
+            <a:avLst/>
+          </a:prstGeom>
+          <a:noFill/>
+        </p:spPr>
+        <p:txBody>
+          <a:bodyPr wrap="square" rtlCol="0" anchor="ctr">
+            <a:spAutoFit/>
+          </a:bodyPr>
+          <a:lstStyle/>
+          <a:p>
+            <a:pPr algn="ctr"/>
+            <a:r>
+              <a:rPr lang="de-DE" sz="1000" dirty="0"/>
+              <a:t>e</a:t>
+            </a:r>
           </a:p>
         </p:txBody>
       </p:sp>

</xml_diff>